<commit_message>
revisión estado mapa 10-05
</commit_message>
<xml_diff>
--- a/fuentes/contenidos/grado10/guion03/CN_10_03.pptx
+++ b/fuentes/contenidos/grado10/guion03/CN_10_03.pptx
@@ -461,7 +461,7 @@
           <a:p>
             <a:fld id="{5001C876-01F7-4317-94B9-1AE222133113}" type="datetimeFigureOut">
               <a:rPr lang="es-ES" smtClean="0"/>
-              <a:t>14/09/2015</a:t>
+              <a:t>22/09/2015</a:t>
             </a:fld>
             <a:endParaRPr lang="es-ES"/>
           </a:p>
@@ -1343,7 +1343,16 @@
               <a:defRPr/>
             </a:pPr>
             <a:r>
-              <a:rPr kumimoji="0" lang="es-ES_tradnl" sz="1000" b="0" i="0" u="none" strike="noStrike" kern="0" cap="none" spc="0" normalizeH="0" baseline="0" noProof="0" dirty="0" smtClean="0">
+              <a:rPr lang="es-ES_tradnl" sz="1000" kern="0" dirty="0">
+                <a:solidFill>
+                  <a:sysClr val="window" lastClr="FFFFFF"/>
+                </a:solidFill>
+                <a:latin typeface="Calibri"/>
+              </a:rPr>
+              <a:t>h</a:t>
+            </a:r>
+            <a:r>
+              <a:rPr kumimoji="0" lang="es-ES_tradnl" sz="1000" b="0" i="0" u="none" strike="noStrike" kern="0" cap="none" spc="0" normalizeH="0" baseline="0" noProof="0" dirty="0" err="1" smtClean="0">
                 <a:ln>
                   <a:noFill/>
                 </a:ln>
@@ -1357,8 +1366,22 @@
                 <a:ea typeface="+mn-ea"/>
                 <a:cs typeface="+mn-cs"/>
               </a:rPr>
-              <a:t>Horizontal</a:t>
-            </a:r>
+              <a:t>orizontal</a:t>
+            </a:r>
+            <a:endParaRPr kumimoji="0" lang="es-ES_tradnl" sz="1000" b="0" i="0" u="none" strike="noStrike" kern="0" cap="none" spc="0" normalizeH="0" baseline="0" noProof="0" dirty="0" smtClean="0">
+              <a:ln>
+                <a:noFill/>
+              </a:ln>
+              <a:solidFill>
+                <a:sysClr val="window" lastClr="FFFFFF"/>
+              </a:solidFill>
+              <a:effectLst/>
+              <a:uLnTx/>
+              <a:uFillTx/>
+              <a:latin typeface="Calibri"/>
+              <a:ea typeface="+mn-ea"/>
+              <a:cs typeface="+mn-cs"/>
+            </a:endParaRPr>
           </a:p>
           <a:p>
             <a:pPr marL="171450" marR="0" lvl="0" indent="-171450" defTabSz="914400" eaLnBrk="1" fontAlgn="auto" latinLnBrk="0" hangingPunct="1">
@@ -1393,24 +1416,7 @@
                 <a:ea typeface="+mn-ea"/>
                 <a:cs typeface="+mn-cs"/>
               </a:rPr>
-              <a:t> </a:t>
-            </a:r>
-            <a:r>
-              <a:rPr kumimoji="0" lang="es-ES_tradnl" sz="1000" b="0" i="0" u="none" strike="noStrike" kern="0" cap="none" spc="0" normalizeH="0" noProof="0" dirty="0" smtClean="0">
-                <a:ln>
-                  <a:noFill/>
-                </a:ln>
-                <a:solidFill>
-                  <a:sysClr val="window" lastClr="FFFFFF"/>
-                </a:solidFill>
-                <a:effectLst/>
-                <a:uLnTx/>
-                <a:uFillTx/>
-                <a:latin typeface="Calibri"/>
-                <a:ea typeface="+mn-ea"/>
-                <a:cs typeface="+mn-cs"/>
-              </a:rPr>
-              <a:t>(</a:t>
+              <a:t> (</a:t>
             </a:r>
             <a:r>
               <a:rPr lang="pt-BR" sz="1000" kern="0" dirty="0" err="1" smtClean="0">
@@ -1481,14 +1487,29 @@
               <a:buChar char="•"/>
             </a:pPr>
             <a:r>
+              <a:rPr lang="es-ES_tradnl" sz="1000" kern="0" dirty="0">
+                <a:solidFill>
+                  <a:sysClr val="window" lastClr="FFFFFF"/>
+                </a:solidFill>
+                <a:latin typeface="Calibri"/>
+              </a:rPr>
+              <a:t>v</a:t>
+            </a:r>
+            <a:r>
               <a:rPr lang="es-ES_tradnl" sz="1000" kern="0" dirty="0" smtClean="0">
                 <a:solidFill>
                   <a:sysClr val="window" lastClr="FFFFFF"/>
                 </a:solidFill>
                 <a:latin typeface="Calibri"/>
               </a:rPr>
-              <a:t>Vertical</a:t>
-            </a:r>
+              <a:t>ertical</a:t>
+            </a:r>
+            <a:endParaRPr lang="es-ES_tradnl" sz="1000" kern="0" dirty="0" smtClean="0">
+              <a:solidFill>
+                <a:sysClr val="window" lastClr="FFFFFF"/>
+              </a:solidFill>
+              <a:latin typeface="Calibri"/>
+            </a:endParaRPr>
           </a:p>
           <a:p>
             <a:pPr marL="171450" indent="-171450" defTabSz="914400">
@@ -1502,16 +1523,7 @@
                 </a:solidFill>
                 <a:latin typeface="Calibri"/>
               </a:rPr>
-              <a:t> </a:t>
-            </a:r>
-            <a:r>
-              <a:rPr lang="es-ES" sz="1000" kern="0" dirty="0" smtClean="0">
-                <a:solidFill>
-                  <a:sysClr val="window" lastClr="FFFFFF"/>
-                </a:solidFill>
-                <a:latin typeface="Calibri"/>
-              </a:rPr>
-              <a:t>(</a:t>
+              <a:t> (</a:t>
             </a:r>
             <a:r>
               <a:rPr lang="el-GR" sz="1000" kern="0" dirty="0" smtClean="0">
@@ -1943,7 +1955,16 @@
               <a:defRPr/>
             </a:pPr>
             <a:r>
-              <a:rPr kumimoji="0" lang="es-ES_tradnl" sz="1000" b="0" i="0" u="none" strike="noStrike" kern="0" cap="none" spc="0" normalizeH="0" baseline="0" noProof="0" dirty="0" smtClean="0">
+              <a:rPr lang="es-ES_tradnl" sz="1000" kern="0" dirty="0">
+                <a:solidFill>
+                  <a:sysClr val="window" lastClr="FFFFFF"/>
+                </a:solidFill>
+                <a:latin typeface="Calibri"/>
+              </a:rPr>
+              <a:t>l</a:t>
+            </a:r>
+            <a:r>
+              <a:rPr kumimoji="0" lang="es-ES_tradnl" sz="1000" b="0" i="0" u="none" strike="noStrike" kern="0" cap="none" spc="0" normalizeH="0" baseline="0" noProof="0" dirty="0" err="1" smtClean="0">
                 <a:ln>
                   <a:noFill/>
                 </a:ln>
@@ -1957,7 +1978,41 @@
                 <a:ea typeface="+mn-ea"/>
                 <a:cs typeface="+mn-cs"/>
               </a:rPr>
-              <a:t>Leyes de Kepler</a:t>
+              <a:t>eyes</a:t>
+            </a:r>
+            <a:r>
+              <a:rPr kumimoji="0" lang="es-ES_tradnl" sz="1000" b="0" i="0" u="none" strike="noStrike" kern="0" cap="none" spc="0" normalizeH="0" baseline="0" noProof="0" dirty="0" smtClean="0">
+                <a:ln>
+                  <a:noFill/>
+                </a:ln>
+                <a:solidFill>
+                  <a:sysClr val="window" lastClr="FFFFFF"/>
+                </a:solidFill>
+                <a:effectLst/>
+                <a:uLnTx/>
+                <a:uFillTx/>
+                <a:latin typeface="Calibri"/>
+                <a:ea typeface="+mn-ea"/>
+                <a:cs typeface="+mn-cs"/>
+              </a:rPr>
+              <a:t> </a:t>
+            </a:r>
+            <a:r>
+              <a:rPr kumimoji="0" lang="es-ES_tradnl" sz="1000" b="0" i="0" u="none" strike="noStrike" kern="0" cap="none" spc="0" normalizeH="0" baseline="0" noProof="0" dirty="0" smtClean="0">
+                <a:ln>
+                  <a:noFill/>
+                </a:ln>
+                <a:solidFill>
+                  <a:sysClr val="window" lastClr="FFFFFF"/>
+                </a:solidFill>
+                <a:effectLst/>
+                <a:uLnTx/>
+                <a:uFillTx/>
+                <a:latin typeface="Calibri"/>
+                <a:ea typeface="+mn-ea"/>
+                <a:cs typeface="+mn-cs"/>
+              </a:rPr>
+              <a:t>de Kepler</a:t>
             </a:r>
             <a:endParaRPr lang="es-ES_tradnl" sz="1000" kern="0" dirty="0" smtClean="0">
               <a:solidFill>
@@ -2225,7 +2280,25 @@
               <a:rPr lang="es-ES_tradnl" sz="900" dirty="0" smtClean="0">
                 <a:effectLst/>
               </a:rPr>
-              <a:t> Ley de los Periodos orbitales     (T^2/R^3 = K = constante)   </a:t>
+              <a:t>Ley </a:t>
+            </a:r>
+            <a:r>
+              <a:rPr lang="es-ES_tradnl" sz="900" dirty="0" smtClean="0">
+                <a:effectLst/>
+              </a:rPr>
+              <a:t>de los </a:t>
+            </a:r>
+            <a:r>
+              <a:rPr lang="es-ES_tradnl" sz="900" dirty="0" smtClean="0">
+                <a:effectLst/>
+              </a:rPr>
+              <a:t>periodos </a:t>
+            </a:r>
+            <a:r>
+              <a:rPr lang="es-ES_tradnl" sz="900" dirty="0" smtClean="0">
+                <a:effectLst/>
+              </a:rPr>
+              <a:t>orbitales     (T^2/R^3 = K = constante)   </a:t>
             </a:r>
             <a:endParaRPr kumimoji="0" lang="es-ES" sz="900" b="0" i="0" u="none" strike="noStrike" kern="0" cap="none" spc="0" normalizeH="0" baseline="0" noProof="0" dirty="0">
               <a:ln>
@@ -2614,14 +2687,29 @@
               <a:defRPr/>
             </a:pPr>
             <a:r>
+              <a:rPr lang="es-ES_tradnl" sz="1000" kern="0" dirty="0">
+                <a:solidFill>
+                  <a:sysClr val="window" lastClr="FFFFFF"/>
+                </a:solidFill>
+                <a:latin typeface="Calibri"/>
+              </a:rPr>
+              <a:t>d</a:t>
+            </a:r>
+            <a:r>
               <a:rPr lang="es-ES_tradnl" sz="1000" kern="0" dirty="0" smtClean="0">
                 <a:solidFill>
                   <a:sysClr val="window" lastClr="FFFFFF"/>
                 </a:solidFill>
                 <a:latin typeface="Calibri"/>
               </a:rPr>
-              <a:t>Definición</a:t>
-            </a:r>
+              <a:t>efinición</a:t>
+            </a:r>
+            <a:endParaRPr lang="es-ES_tradnl" sz="1000" kern="0" dirty="0" smtClean="0">
+              <a:solidFill>
+                <a:sysClr val="window" lastClr="FFFFFF"/>
+              </a:solidFill>
+              <a:latin typeface="Calibri"/>
+            </a:endParaRPr>
           </a:p>
         </p:txBody>
       </p:sp>
@@ -2722,7 +2810,23 @@
                   <a:sysClr val="windowText" lastClr="000000"/>
                 </a:solidFill>
               </a:rPr>
-              <a:t>Movimiento en el plano bajo la acción de un campo </a:t>
+              <a:t>m</a:t>
+            </a:r>
+            <a:r>
+              <a:rPr lang="es-ES_tradnl" sz="900" kern="0" dirty="0" smtClean="0">
+                <a:solidFill>
+                  <a:sysClr val="windowText" lastClr="000000"/>
+                </a:solidFill>
+              </a:rPr>
+              <a:t>ovimiento </a:t>
+            </a:r>
+            <a:r>
+              <a:rPr lang="es-ES_tradnl" sz="900" kern="0" dirty="0">
+                <a:solidFill>
+                  <a:sysClr val="windowText" lastClr="000000"/>
+                </a:solidFill>
+              </a:rPr>
+              <a:t>en el plano bajo la acción de un campo </a:t>
             </a:r>
             <a:r>
               <a:rPr lang="es-ES_tradnl" sz="900" kern="0" dirty="0" smtClean="0">
@@ -2907,6 +3011,15 @@
               <a:buChar char="•"/>
             </a:pPr>
             <a:r>
+              <a:rPr lang="es-ES" sz="900" kern="0" dirty="0">
+                <a:solidFill>
+                  <a:sysClr val="windowText" lastClr="000000"/>
+                </a:solidFill>
+                <a:latin typeface="Calibri"/>
+              </a:rPr>
+              <a:t>e</a:t>
+            </a:r>
+            <a:r>
               <a:rPr kumimoji="0" lang="es-ES" sz="900" b="0" i="0" u="none" strike="noStrike" kern="0" cap="none" spc="0" normalizeH="0" baseline="0" noProof="0" dirty="0" smtClean="0">
                 <a:ln>
                   <a:noFill/>
@@ -2921,7 +3034,50 @@
                 <a:ea typeface="+mn-ea"/>
                 <a:cs typeface="+mn-cs"/>
               </a:rPr>
-              <a:t>Eje x (</a:t>
+              <a:t>je </a:t>
+            </a:r>
+            <a:r>
+              <a:rPr lang="es-ES" sz="900" kern="0" dirty="0">
+                <a:solidFill>
+                  <a:sysClr val="windowText" lastClr="000000"/>
+                </a:solidFill>
+                <a:latin typeface="Calibri"/>
+              </a:rPr>
+              <a:t>x</a:t>
+            </a:r>
+            <a:r>
+              <a:rPr kumimoji="0" lang="es-ES" sz="900" b="0" i="0" u="none" strike="noStrike" kern="0" cap="none" spc="0" normalizeH="0" baseline="0" noProof="0" dirty="0" smtClean="0">
+                <a:ln>
+                  <a:noFill/>
+                </a:ln>
+                <a:solidFill>
+                  <a:sysClr val="windowText" lastClr="000000"/>
+                </a:solidFill>
+                <a:effectLst/>
+                <a:uLnTx/>
+                <a:uFillTx/>
+                <a:latin typeface="Calibri"/>
+                <a:ea typeface="+mn-ea"/>
+                <a:cs typeface="+mn-cs"/>
+              </a:rPr>
+              <a:t> </a:t>
+            </a:r>
+            <a:r>
+              <a:rPr kumimoji="0" lang="es-ES" sz="900" b="0" i="0" u="none" strike="noStrike" kern="0" cap="none" spc="0" normalizeH="0" baseline="0" noProof="0" dirty="0" smtClean="0">
+                <a:ln>
+                  <a:noFill/>
+                </a:ln>
+                <a:solidFill>
+                  <a:sysClr val="windowText" lastClr="000000"/>
+                </a:solidFill>
+                <a:effectLst/>
+                <a:uLnTx/>
+                <a:uFillTx/>
+                <a:latin typeface="Calibri"/>
+                <a:ea typeface="+mn-ea"/>
+                <a:cs typeface="+mn-cs"/>
+              </a:rPr>
+              <a:t>(</a:t>
             </a:r>
             <a:r>
               <a:rPr lang="es-ES_tradnl" sz="900" kern="0" noProof="0" dirty="0" smtClean="0">
@@ -2970,12 +3126,28 @@
               <a:buChar char="•"/>
             </a:pPr>
             <a:r>
+              <a:rPr lang="es-ES_tradnl" sz="900" kern="0" dirty="0">
+                <a:solidFill>
+                  <a:sysClr val="windowText" lastClr="000000"/>
+                </a:solidFill>
+              </a:rPr>
+              <a:t>e</a:t>
+            </a:r>
+            <a:r>
               <a:rPr lang="es-ES_tradnl" sz="900" kern="0" dirty="0" smtClean="0">
                 <a:solidFill>
                   <a:sysClr val="windowText" lastClr="000000"/>
                 </a:solidFill>
               </a:rPr>
-              <a:t>Eje y (</a:t>
+              <a:t>je </a:t>
+            </a:r>
+            <a:r>
+              <a:rPr lang="es-ES_tradnl" sz="900" kern="0" dirty="0" smtClean="0">
+                <a:solidFill>
+                  <a:sysClr val="windowText" lastClr="000000"/>
+                </a:solidFill>
+              </a:rPr>
+              <a:t>y (</a:t>
             </a:r>
             <a:r>
               <a:rPr lang="es-ES_tradnl" sz="900" dirty="0" smtClean="0"/>
@@ -2983,13 +3155,17 @@
             </a:r>
             <a:r>
               <a:rPr lang="es-ES_tradnl" sz="900" dirty="0"/>
-              <a:t>libre/lanzamiento vertical</a:t>
+              <a:t>libre/lanzamiento </a:t>
+            </a:r>
+            <a:r>
+              <a:rPr lang="es-ES_tradnl" sz="900" dirty="0" smtClean="0"/>
+              <a:t>vertical</a:t>
             </a:r>
             <a:r>
               <a:rPr lang="es-ES_tradnl" sz="900" dirty="0" smtClean="0">
                 <a:effectLst/>
               </a:rPr>
-              <a:t> )</a:t>
+              <a:t>)</a:t>
             </a:r>
             <a:r>
               <a:rPr lang="es-ES_tradnl" sz="900" kern="0" dirty="0" smtClean="0">
@@ -3145,7 +3321,23 @@
                   <a:sysClr val="window" lastClr="FFFFFF"/>
                 </a:solidFill>
               </a:rPr>
-              <a:t>Uniformemente acelerado</a:t>
+              <a:t>Uniformemente </a:t>
+            </a:r>
+            <a:r>
+              <a:rPr lang="es-CO" sz="1000" kern="0" dirty="0" smtClean="0">
+                <a:solidFill>
+                  <a:sysClr val="window" lastClr="FFFFFF"/>
+                </a:solidFill>
+              </a:rPr>
+              <a:t>A</a:t>
+            </a:r>
+            <a:r>
+              <a:rPr lang="ro-RO" sz="1000" kern="0" dirty="0" smtClean="0">
+                <a:solidFill>
+                  <a:sysClr val="window" lastClr="FFFFFF"/>
+                </a:solidFill>
+              </a:rPr>
+              <a:t>celerado</a:t>
             </a:r>
             <a:endParaRPr lang="es-ES_tradnl" sz="1000" kern="0" dirty="0" smtClean="0">
               <a:solidFill>
@@ -3363,7 +3555,16 @@
           <a:p>
             <a:pPr lvl="0" algn="ctr" defTabSz="914400"/>
             <a:r>
-              <a:rPr kumimoji="0" lang="es-ES" sz="900" b="0" i="0" u="none" strike="noStrike" kern="0" cap="none" spc="0" normalizeH="0" baseline="0" noProof="0" dirty="0" smtClean="0">
+              <a:rPr lang="es-ES" sz="900" kern="0" dirty="0">
+                <a:solidFill>
+                  <a:sysClr val="windowText" lastClr="000000"/>
+                </a:solidFill>
+                <a:latin typeface="Calibri"/>
+              </a:rPr>
+              <a:t>a</a:t>
+            </a:r>
+            <a:r>
+              <a:rPr kumimoji="0" lang="es-ES" sz="900" b="0" i="0" u="none" strike="noStrike" kern="0" cap="none" spc="0" normalizeH="0" baseline="0" noProof="0" dirty="0" err="1" smtClean="0">
                 <a:ln>
                   <a:noFill/>
                 </a:ln>
@@ -3377,7 +3578,7 @@
                 <a:ea typeface="+mn-ea"/>
                 <a:cs typeface="+mn-cs"/>
               </a:rPr>
-              <a:t>Aceleración</a:t>
+              <a:t>celeración</a:t>
             </a:r>
             <a:endParaRPr kumimoji="0" lang="es-ES" sz="900" b="0" i="0" u="none" strike="noStrike" kern="0" cap="none" spc="0" normalizeH="0" baseline="0" noProof="0" dirty="0">
               <a:ln>
@@ -3582,14 +3783,29 @@
               <a:buChar char="•"/>
             </a:pPr>
             <a:r>
+              <a:rPr lang="es-ES" sz="900" kern="0" dirty="0">
+                <a:solidFill>
+                  <a:sysClr val="windowText" lastClr="000000"/>
+                </a:solidFill>
+                <a:latin typeface="Calibri"/>
+              </a:rPr>
+              <a:t>t</a:t>
+            </a:r>
+            <a:r>
               <a:rPr lang="es-ES" sz="900" kern="0" dirty="0" smtClean="0">
                 <a:solidFill>
                   <a:sysClr val="windowText" lastClr="000000"/>
                 </a:solidFill>
                 <a:latin typeface="Calibri"/>
               </a:rPr>
-              <a:t>Tangencial</a:t>
-            </a:r>
+              <a:t>angencial</a:t>
+            </a:r>
+            <a:endParaRPr lang="es-ES" sz="900" kern="0" dirty="0" smtClean="0">
+              <a:solidFill>
+                <a:sysClr val="windowText" lastClr="000000"/>
+              </a:solidFill>
+              <a:latin typeface="Calibri"/>
+            </a:endParaRPr>
           </a:p>
           <a:p>
             <a:pPr algn="ctr" defTabSz="914400"/>
@@ -3621,7 +3837,16 @@
               <a:buChar char="•"/>
             </a:pPr>
             <a:r>
-              <a:rPr kumimoji="0" lang="es-ES_tradnl" sz="900" b="0" i="0" u="none" strike="noStrike" kern="0" cap="none" spc="0" normalizeH="0" baseline="0" noProof="0" dirty="0" smtClean="0">
+              <a:rPr lang="es-ES_tradnl" sz="900" kern="0" dirty="0">
+                <a:solidFill>
+                  <a:sysClr val="windowText" lastClr="000000"/>
+                </a:solidFill>
+                <a:latin typeface="Calibri"/>
+              </a:rPr>
+              <a:t>c</a:t>
+            </a:r>
+            <a:r>
+              <a:rPr kumimoji="0" lang="es-ES_tradnl" sz="900" b="0" i="0" u="none" strike="noStrike" kern="0" cap="none" spc="0" normalizeH="0" baseline="0" noProof="0" dirty="0" err="1" smtClean="0">
                 <a:ln>
                   <a:noFill/>
                 </a:ln>
@@ -3635,8 +3860,22 @@
                 <a:ea typeface="+mn-ea"/>
                 <a:cs typeface="+mn-cs"/>
               </a:rPr>
-              <a:t>Centrípeta</a:t>
-            </a:r>
+              <a:t>entrípeta</a:t>
+            </a:r>
+            <a:endParaRPr kumimoji="0" lang="es-ES_tradnl" sz="900" b="0" i="0" u="none" strike="noStrike" kern="0" cap="none" spc="0" normalizeH="0" baseline="0" noProof="0" dirty="0" smtClean="0">
+              <a:ln>
+                <a:noFill/>
+              </a:ln>
+              <a:solidFill>
+                <a:sysClr val="windowText" lastClr="000000"/>
+              </a:solidFill>
+              <a:effectLst/>
+              <a:uLnTx/>
+              <a:uFillTx/>
+              <a:latin typeface="Calibri"/>
+              <a:ea typeface="+mn-ea"/>
+              <a:cs typeface="+mn-cs"/>
+            </a:endParaRPr>
           </a:p>
           <a:p>
             <a:pPr algn="ctr" defTabSz="914400"/>
@@ -3733,7 +3972,23 @@
                   <a:sysClr val="windowText" lastClr="000000"/>
                 </a:solidFill>
               </a:rPr>
-              <a:t>Velocidad angular variable</a:t>
+              <a:t>v</a:t>
+            </a:r>
+            <a:r>
+              <a:rPr lang="es-ES_tradnl" sz="900" kern="0" dirty="0" smtClean="0">
+                <a:solidFill>
+                  <a:sysClr val="windowText" lastClr="000000"/>
+                </a:solidFill>
+              </a:rPr>
+              <a:t>elocidad </a:t>
+            </a:r>
+            <a:r>
+              <a:rPr lang="es-ES_tradnl" sz="900" kern="0" dirty="0">
+                <a:solidFill>
+                  <a:sysClr val="windowText" lastClr="000000"/>
+                </a:solidFill>
+              </a:rPr>
+              <a:t>angular variable</a:t>
             </a:r>
             <a:endParaRPr kumimoji="0" lang="es-ES" sz="900" b="0" i="0" u="none" strike="noStrike" kern="0" cap="none" spc="0" normalizeH="0" baseline="0" noProof="0" dirty="0">
               <a:ln>
@@ -3884,7 +4139,15 @@
                   <a:sysClr val="windowText" lastClr="000000"/>
                 </a:solidFill>
               </a:rPr>
-              <a:t>Aceleración </a:t>
+              <a:t>a</a:t>
+            </a:r>
+            <a:r>
+              <a:rPr lang="es-ES_tradnl" sz="900" kern="0" dirty="0" smtClean="0">
+                <a:solidFill>
+                  <a:sysClr val="windowText" lastClr="000000"/>
+                </a:solidFill>
+              </a:rPr>
+              <a:t>celeración </a:t>
             </a:r>
             <a:r>
               <a:rPr lang="es-ES_tradnl" sz="900" kern="0" dirty="0" smtClean="0">
@@ -4090,8 +4353,12 @@
               <a:buChar char="•"/>
             </a:pPr>
             <a:r>
+              <a:rPr lang="es-ES_tradnl" sz="900" dirty="0"/>
+              <a:t>d</a:t>
+            </a:r>
+            <a:r>
               <a:rPr lang="es-ES_tradnl" sz="900" dirty="0" smtClean="0"/>
-              <a:t>Desplazamiento </a:t>
+              <a:t>esplazamiento </a:t>
             </a:r>
             <a:r>
               <a:rPr lang="es-ES_tradnl" sz="900" dirty="0"/>
@@ -4105,15 +4372,7 @@
             </a:r>
             <a:r>
               <a:rPr lang="es-ES_tradnl" sz="900" dirty="0" smtClean="0"/>
-              <a:t>∆</a:t>
-            </a:r>
-            <a:r>
-              <a:rPr lang="es-ES_tradnl" sz="900" dirty="0" err="1" smtClean="0"/>
-              <a:t>φ</a:t>
-            </a:r>
-            <a:r>
-              <a:rPr lang="es-ES_tradnl" sz="900" dirty="0" smtClean="0"/>
-              <a:t>)</a:t>
+              <a:t>∆φ)</a:t>
             </a:r>
           </a:p>
           <a:p>
@@ -4122,14 +4381,16 @@
               <a:buChar char="•"/>
             </a:pPr>
             <a:r>
-              <a:rPr lang="es-ES_tradnl" sz="900" dirty="0" smtClean="0">
-                <a:effectLst/>
-              </a:rPr>
-              <a:t> </a:t>
-            </a:r>
-            <a:r>
               <a:rPr lang="es-ES_tradnl" sz="900" dirty="0"/>
-              <a:t>Longitud de arco recorrida</a:t>
+              <a:t>l</a:t>
+            </a:r>
+            <a:r>
+              <a:rPr lang="es-ES_tradnl" sz="900" dirty="0" smtClean="0"/>
+              <a:t>ongitud </a:t>
+            </a:r>
+            <a:r>
+              <a:rPr lang="es-ES_tradnl" sz="900" dirty="0"/>
+              <a:t>de arco recorrida</a:t>
             </a:r>
             <a:r>
               <a:rPr lang="es-ES_tradnl" sz="900" dirty="0" smtClean="0">
@@ -4165,27 +4426,23 @@
             </a:pPr>
             <a:r>
               <a:rPr lang="it-IT" sz="900" dirty="0"/>
-              <a:t>Periodo (</a:t>
-            </a:r>
-            <a:r>
-              <a:rPr lang="it-IT" sz="900" dirty="0" err="1" smtClean="0"/>
-              <a:t>f</a:t>
+              <a:t>p</a:t>
             </a:r>
             <a:r>
               <a:rPr lang="it-IT" sz="900" dirty="0" smtClean="0"/>
-              <a:t> </a:t>
+              <a:t>eriodo </a:t>
             </a:r>
             <a:r>
               <a:rPr lang="it-IT" sz="900" dirty="0"/>
-              <a:t>= </a:t>
-            </a:r>
-            <a:r>
-              <a:rPr lang="it-IT" sz="900" dirty="0" err="1"/>
-              <a:t>n</a:t>
+              <a:t>(</a:t>
+            </a:r>
+            <a:r>
+              <a:rPr lang="it-IT" sz="900" dirty="0" smtClean="0"/>
+              <a:t>f </a:t>
             </a:r>
             <a:r>
               <a:rPr lang="it-IT" sz="900" dirty="0"/>
-              <a:t>/</a:t>
+              <a:t>= n/</a:t>
             </a:r>
             <a:r>
               <a:rPr lang="it-IT" sz="900" dirty="0" smtClean="0"/>
@@ -4204,14 +4461,24 @@
               <a:buChar char="•"/>
             </a:pPr>
             <a:r>
+              <a:rPr lang="es-ES_tradnl" sz="900" dirty="0"/>
+              <a:t>f</a:t>
+            </a:r>
+            <a:r>
               <a:rPr lang="es-ES_tradnl" sz="900" dirty="0" smtClean="0"/>
-              <a:t>Frecuencia</a:t>
+              <a:t>recuencia</a:t>
             </a:r>
             <a:r>
               <a:rPr lang="es-ES_tradnl" sz="900" dirty="0" smtClean="0">
                 <a:effectLst/>
               </a:rPr>
-              <a:t> (</a:t>
+              <a:t> </a:t>
+            </a:r>
+            <a:r>
+              <a:rPr lang="es-ES_tradnl" sz="900" dirty="0" smtClean="0">
+                <a:effectLst/>
+              </a:rPr>
+              <a:t>(</a:t>
             </a:r>
             <a:r>
               <a:rPr lang="es-ES_tradnl" sz="900" dirty="0" smtClean="0"/>
@@ -4232,8 +4499,12 @@
               <a:buChar char="•"/>
             </a:pPr>
             <a:r>
+              <a:rPr lang="es-ES_tradnl" sz="900" dirty="0"/>
+              <a:t>v</a:t>
+            </a:r>
+            <a:r>
               <a:rPr lang="es-ES_tradnl" sz="900" dirty="0" smtClean="0"/>
-              <a:t>Velocidad </a:t>
+              <a:t>elocidad </a:t>
             </a:r>
             <a:r>
               <a:rPr lang="es-ES_tradnl" sz="900" dirty="0"/>
@@ -4246,24 +4517,12 @@
               <a:t>              (</a:t>
             </a:r>
             <a:r>
-              <a:rPr lang="es-ES_tradnl" sz="900" dirty="0" err="1" smtClean="0"/>
-              <a:t>ω</a:t>
-            </a:r>
-            <a:r>
               <a:rPr lang="es-ES_tradnl" sz="900" dirty="0" smtClean="0"/>
-              <a:t> </a:t>
+              <a:t>ω </a:t>
             </a:r>
             <a:r>
               <a:rPr lang="es-ES_tradnl" sz="900" dirty="0"/>
-              <a:t>= ∆</a:t>
-            </a:r>
-            <a:r>
-              <a:rPr lang="es-ES_tradnl" sz="900" dirty="0" err="1"/>
-              <a:t>φ</a:t>
-            </a:r>
-            <a:r>
-              <a:rPr lang="es-ES_tradnl" sz="900" dirty="0"/>
-              <a:t>/∆</a:t>
+              <a:t>= ∆φ/∆</a:t>
             </a:r>
             <a:r>
               <a:rPr lang="es-ES_tradnl" sz="900" dirty="0" smtClean="0"/>
@@ -4284,12 +4543,8 @@
               <a:t> </a:t>
             </a:r>
             <a:r>
-              <a:rPr lang="es-ES_tradnl" sz="900" dirty="0" err="1" smtClean="0"/>
-              <a:t>ω</a:t>
-            </a:r>
-            <a:r>
               <a:rPr lang="es-ES_tradnl" sz="900" dirty="0" smtClean="0"/>
-              <a:t> </a:t>
+              <a:t>ω </a:t>
             </a:r>
             <a:r>
               <a:rPr lang="es-ES_tradnl" sz="900" dirty="0"/>
@@ -4302,12 +4557,8 @@
               <a:t> - </a:t>
             </a:r>
             <a:r>
-              <a:rPr lang="es-ES_tradnl" sz="900" dirty="0" err="1" smtClean="0"/>
-              <a:t>ω</a:t>
-            </a:r>
-            <a:r>
               <a:rPr lang="es-ES_tradnl" sz="900" dirty="0" smtClean="0"/>
-              <a:t> </a:t>
+              <a:t>ω </a:t>
             </a:r>
             <a:r>
               <a:rPr lang="es-ES_tradnl" sz="900" dirty="0"/>
@@ -4326,8 +4577,12 @@
               <a:buChar char="•"/>
             </a:pPr>
             <a:r>
+              <a:rPr lang="es-ES_tradnl" sz="900" dirty="0"/>
+              <a:t>m</a:t>
+            </a:r>
+            <a:r>
               <a:rPr lang="es-ES_tradnl" sz="900" dirty="0" smtClean="0"/>
-              <a:t>Magnitud </a:t>
+              <a:t>agnitud </a:t>
             </a:r>
             <a:r>
               <a:rPr lang="es-ES_tradnl" sz="900" dirty="0"/>
@@ -4392,10 +4647,20 @@
               <a:buChar char="•"/>
             </a:pPr>
             <a:r>
+              <a:rPr lang="es-ES_tradnl" sz="900" dirty="0"/>
+              <a:t>c</a:t>
+            </a:r>
+            <a:r>
+              <a:rPr lang="es-ES_tradnl" sz="900" smtClean="0">
+                <a:effectLst/>
+              </a:rPr>
+              <a:t>ambio </a:t>
+            </a:r>
+            <a:r>
               <a:rPr lang="es-ES_tradnl" sz="900" dirty="0" smtClean="0">
                 <a:effectLst/>
               </a:rPr>
-              <a:t>Cambio de dirección de la velocidad lineal que genera aceleración centrípeta (</a:t>
+              <a:t>de dirección de la velocidad lineal que genera aceleración centrípeta (</a:t>
             </a:r>
             <a:r>
               <a:rPr lang="en-US" sz="900" dirty="0"/>

</xml_diff>

<commit_message>
mapa 10-3 - escaleta 10-17
</commit_message>
<xml_diff>
--- a/fuentes/contenidos/grado10/guion03/CN_10_03.pptx
+++ b/fuentes/contenidos/grado10/guion03/CN_10_03.pptx
@@ -461,9 +461,9 @@
           <a:p>
             <a:fld id="{5001C876-01F7-4317-94B9-1AE222133113}" type="datetimeFigureOut">
               <a:rPr lang="es-ES" smtClean="0"/>
-              <a:t>22/09/2015</a:t>
+              <a:t>09/05/2016</a:t>
             </a:fld>
-            <a:endParaRPr lang="es-ES"/>
+            <a:endParaRPr lang="es-ES" dirty="0"/>
           </a:p>
         </p:txBody>
       </p:sp>
@@ -490,7 +490,7 @@
           <a:bodyPr/>
           <a:lstStyle/>
           <a:p>
-            <a:endParaRPr lang="es-ES"/>
+            <a:endParaRPr lang="es-ES" dirty="0"/>
           </a:p>
         </p:txBody>
       </p:sp>
@@ -521,7 +521,7 @@
               <a:rPr lang="es-ES" smtClean="0"/>
               <a:t>‹Nº›</a:t>
             </a:fld>
-            <a:endParaRPr lang="es-ES"/>
+            <a:endParaRPr lang="es-ES" dirty="0"/>
           </a:p>
         </p:txBody>
       </p:sp>
@@ -1146,7 +1146,7 @@
               <a:defRPr/>
             </a:pPr>
             <a:r>
-              <a:rPr kumimoji="0" lang="en-US" sz="900" b="0" i="0" u="none" strike="noStrike" kern="0" cap="none" spc="0" normalizeH="0" baseline="0" noProof="0" dirty="0" err="1" smtClean="0">
+              <a:rPr kumimoji="0" lang="es-CO" sz="900" b="0" i="0" u="none" strike="noStrike" kern="0" cap="none" spc="0" normalizeH="0" baseline="0" dirty="0" smtClean="0">
                 <a:ln>
                   <a:noFill/>
                 </a:ln>
@@ -1159,7 +1159,7 @@
               </a:rPr>
               <a:t>presenta</a:t>
             </a:r>
-            <a:endParaRPr kumimoji="0" lang="es-ES" sz="900" b="0" i="0" u="none" strike="noStrike" kern="0" cap="none" spc="0" normalizeH="0" baseline="0" noProof="0" dirty="0">
+            <a:endParaRPr kumimoji="0" lang="es-CO" sz="900" b="0" i="0" u="none" strike="noStrike" kern="0" cap="none" spc="0" normalizeH="0" baseline="0" dirty="0">
               <a:ln>
                 <a:noFill/>
               </a:ln>
@@ -1384,7 +1384,7 @@
             </a:endParaRPr>
           </a:p>
           <a:p>
-            <a:pPr marL="171450" marR="0" lvl="0" indent="-171450" defTabSz="914400" eaLnBrk="1" fontAlgn="auto" latinLnBrk="0" hangingPunct="1">
+            <a:pPr marR="0" lvl="0" defTabSz="914400" eaLnBrk="1" fontAlgn="auto" latinLnBrk="0" hangingPunct="1">
               <a:lnSpc>
                 <a:spcPct val="100000"/>
               </a:lnSpc>
@@ -1396,11 +1396,27 @@
               </a:spcAft>
               <a:buClrTx/>
               <a:buSzTx/>
-              <a:buFont typeface="Arial"/>
-              <a:buChar char="•"/>
               <a:tabLst/>
               <a:defRPr/>
             </a:pPr>
+            <a:r>
+              <a:rPr lang="es-ES_tradnl" sz="1000" kern="0" dirty="0">
+                <a:solidFill>
+                  <a:sysClr val="window" lastClr="FFFFFF"/>
+                </a:solidFill>
+                <a:latin typeface="Calibri"/>
+              </a:rPr>
+              <a:t> </a:t>
+            </a:r>
+            <a:r>
+              <a:rPr lang="es-ES_tradnl" sz="1000" kern="0" dirty="0" smtClean="0">
+                <a:solidFill>
+                  <a:sysClr val="window" lastClr="FFFFFF"/>
+                </a:solidFill>
+                <a:latin typeface="Calibri"/>
+              </a:rPr>
+              <a:t>     </a:t>
+            </a:r>
             <a:r>
               <a:rPr kumimoji="0" lang="es-ES_tradnl" sz="1000" b="0" i="0" u="none" strike="noStrike" kern="0" cap="none" spc="0" normalizeH="0" noProof="0" dirty="0" smtClean="0">
                 <a:ln>
@@ -1416,7 +1432,7 @@
                 <a:ea typeface="+mn-ea"/>
                 <a:cs typeface="+mn-cs"/>
               </a:rPr>
-              <a:t> (</a:t>
+              <a:t>(</a:t>
             </a:r>
             <a:r>
               <a:rPr lang="pt-BR" sz="1000" kern="0" dirty="0" err="1" smtClean="0">
@@ -1424,7 +1440,15 @@
                   <a:sysClr val="window" lastClr="FFFFFF"/>
                 </a:solidFill>
               </a:rPr>
-              <a:t>v_x</a:t>
+              <a:t>v</a:t>
+            </a:r>
+            <a:r>
+              <a:rPr lang="pt-BR" sz="1000" kern="0" baseline="-25000" dirty="0" err="1" smtClean="0">
+                <a:solidFill>
+                  <a:sysClr val="window" lastClr="FFFFFF"/>
+                </a:solidFill>
+              </a:rPr>
+              <a:t>x</a:t>
             </a:r>
             <a:r>
               <a:rPr lang="pt-BR" sz="1000" kern="0" dirty="0" smtClean="0">
@@ -1440,23 +1464,7 @@
                   <a:sysClr val="window" lastClr="FFFFFF"/>
                 </a:solidFill>
               </a:rPr>
-              <a:t>= </a:t>
-            </a:r>
-            <a:r>
-              <a:rPr lang="pt-BR" sz="1000" kern="0" dirty="0" err="1">
-                <a:solidFill>
-                  <a:sysClr val="window" lastClr="FFFFFF"/>
-                </a:solidFill>
-              </a:rPr>
-              <a:t>v</a:t>
-            </a:r>
-            <a:r>
-              <a:rPr lang="pt-BR" sz="1000" kern="0" dirty="0">
-                <a:solidFill>
-                  <a:sysClr val="window" lastClr="FFFFFF"/>
-                </a:solidFill>
-              </a:rPr>
-              <a:t>  cos </a:t>
+              <a:t>= v  cos </a:t>
             </a:r>
             <a:r>
               <a:rPr lang="pt-BR" sz="1000" kern="0" dirty="0" smtClean="0">
@@ -1504,18 +1512,27 @@
               </a:rPr>
               <a:t>ertical</a:t>
             </a:r>
-            <a:endParaRPr lang="es-ES_tradnl" sz="1000" kern="0" dirty="0" smtClean="0">
-              <a:solidFill>
-                <a:sysClr val="window" lastClr="FFFFFF"/>
-              </a:solidFill>
-              <a:latin typeface="Calibri"/>
-            </a:endParaRPr>
           </a:p>
           <a:p>
-            <a:pPr marL="171450" indent="-171450" defTabSz="914400">
-              <a:buFont typeface="Arial"/>
-              <a:buChar char="•"/>
-            </a:pPr>
+            <a:pPr defTabSz="914400"/>
+            <a:r>
+              <a:rPr lang="es-ES_tradnl" sz="1000" kern="0" dirty="0">
+                <a:solidFill>
+                  <a:sysClr val="window" lastClr="FFFFFF"/>
+                </a:solidFill>
+                <a:latin typeface="Calibri"/>
+              </a:rPr>
+              <a:t> </a:t>
+            </a:r>
+            <a:r>
+              <a:rPr lang="es-ES_tradnl" sz="1000" kern="0" dirty="0" smtClean="0">
+                <a:solidFill>
+                  <a:sysClr val="window" lastClr="FFFFFF"/>
+                </a:solidFill>
+                <a:latin typeface="Calibri"/>
+              </a:rPr>
+              <a:t>     </a:t>
+            </a:r>
             <a:r>
               <a:rPr lang="es-ES" sz="1000" kern="0" dirty="0" smtClean="0">
                 <a:solidFill>
@@ -1523,7 +1540,7 @@
                 </a:solidFill>
                 <a:latin typeface="Calibri"/>
               </a:rPr>
-              <a:t> (</a:t>
+              <a:t>(</a:t>
             </a:r>
             <a:r>
               <a:rPr lang="el-GR" sz="1000" kern="0" dirty="0" smtClean="0">
@@ -1531,7 +1548,23 @@
                   <a:sysClr val="window" lastClr="FFFFFF"/>
                 </a:solidFill>
               </a:rPr>
-              <a:t>v_y </a:t>
+              <a:t>v</a:t>
+            </a:r>
+            <a:r>
+              <a:rPr lang="el-GR" sz="1000" kern="0" baseline="-25000" dirty="0" smtClean="0">
+                <a:solidFill>
+                  <a:sysClr val="window" lastClr="FFFFFF"/>
+                </a:solidFill>
+              </a:rPr>
+              <a:t>y</a:t>
+            </a:r>
+            <a:r>
+              <a:rPr lang="el-GR" sz="1000" kern="0" dirty="0" smtClean="0">
+                <a:solidFill>
+                  <a:sysClr val="window" lastClr="FFFFFF"/>
+                </a:solidFill>
+              </a:rPr>
+              <a:t> </a:t>
             </a:r>
             <a:r>
               <a:rPr lang="el-GR" sz="1000" kern="0" dirty="0">
@@ -1995,24 +2028,7 @@
                 <a:ea typeface="+mn-ea"/>
                 <a:cs typeface="+mn-cs"/>
               </a:rPr>
-              <a:t> </a:t>
-            </a:r>
-            <a:r>
-              <a:rPr kumimoji="0" lang="es-ES_tradnl" sz="1000" b="0" i="0" u="none" strike="noStrike" kern="0" cap="none" spc="0" normalizeH="0" baseline="0" noProof="0" dirty="0" smtClean="0">
-                <a:ln>
-                  <a:noFill/>
-                </a:ln>
-                <a:solidFill>
-                  <a:sysClr val="window" lastClr="FFFFFF"/>
-                </a:solidFill>
-                <a:effectLst/>
-                <a:uLnTx/>
-                <a:uFillTx/>
-                <a:latin typeface="Calibri"/>
-                <a:ea typeface="+mn-ea"/>
-                <a:cs typeface="+mn-cs"/>
-              </a:rPr>
-              <a:t>de Kepler</a:t>
+              <a:t> de Kepler</a:t>
             </a:r>
             <a:endParaRPr lang="es-ES_tradnl" sz="1000" kern="0" dirty="0" smtClean="0">
               <a:solidFill>
@@ -2188,7 +2204,7 @@
         <p:spPr>
           <a:xfrm>
             <a:off x="2407760" y="3147293"/>
-            <a:ext cx="1375" cy="201014"/>
+            <a:ext cx="24671" cy="201014"/>
           </a:xfrm>
           <a:prstGeom prst="straightConnector1">
             <a:avLst/>
@@ -2212,8 +2228,8 @@
         </p:nvSpPr>
         <p:spPr>
           <a:xfrm>
-            <a:off x="1844688" y="3348307"/>
-            <a:ext cx="1128893" cy="1488704"/>
+            <a:off x="1805004" y="3348307"/>
+            <a:ext cx="1254854" cy="1488704"/>
           </a:xfrm>
           <a:prstGeom prst="rect">
             <a:avLst/>
@@ -2241,8 +2257,12 @@
               <a:buAutoNum type="arabicPeriod"/>
             </a:pPr>
             <a:r>
+              <a:rPr lang="es-ES_tradnl" sz="900" dirty="0"/>
+              <a:t>t</a:t>
+            </a:r>
+            <a:r>
               <a:rPr lang="es-ES_tradnl" sz="900" dirty="0" smtClean="0"/>
-              <a:t>Trayectorias </a:t>
+              <a:t>rayectorias </a:t>
             </a:r>
             <a:r>
               <a:rPr lang="es-ES_tradnl" sz="900" dirty="0"/>
@@ -2260,7 +2280,7 @@
             </a:pPr>
             <a:r>
               <a:rPr lang="es-ES_tradnl" sz="900" dirty="0" smtClean="0"/>
-              <a:t>Ley </a:t>
+              <a:t>ley </a:t>
             </a:r>
             <a:r>
               <a:rPr lang="es-ES_tradnl" sz="900" dirty="0"/>
@@ -2268,8 +2288,9 @@
             </a:r>
             <a:r>
               <a:rPr lang="es-ES_tradnl" sz="900" dirty="0" smtClean="0"/>
-              <a:t>áreas</a:t>
-            </a:r>
+              <a:t>áreas.</a:t>
+            </a:r>
+            <a:endParaRPr lang="es-ES_tradnl" sz="900" dirty="0" smtClean="0"/>
           </a:p>
           <a:p>
             <a:pPr marL="228600" lvl="0" indent="-228600" defTabSz="914400">
@@ -2277,28 +2298,68 @@
               <a:buAutoNum type="arabicPeriod"/>
             </a:pPr>
             <a:r>
+              <a:rPr lang="es-ES_tradnl" sz="900" dirty="0"/>
+              <a:t>l</a:t>
+            </a:r>
+            <a:r>
               <a:rPr lang="es-ES_tradnl" sz="900" dirty="0" smtClean="0">
                 <a:effectLst/>
               </a:rPr>
-              <a:t>Ley </a:t>
+              <a:t>ey </a:t>
             </a:r>
             <a:r>
               <a:rPr lang="es-ES_tradnl" sz="900" dirty="0" smtClean="0">
                 <a:effectLst/>
               </a:rPr>
-              <a:t>de los </a:t>
+              <a:t>de los periodos orbitales     (</a:t>
             </a:r>
             <a:r>
               <a:rPr lang="es-ES_tradnl" sz="900" dirty="0" smtClean="0">
                 <a:effectLst/>
               </a:rPr>
-              <a:t>periodos </a:t>
+              <a:t>T</a:t>
+            </a:r>
+            <a:r>
+              <a:rPr lang="es-ES_tradnl" sz="900" baseline="30000" dirty="0" smtClean="0">
+                <a:effectLst/>
+              </a:rPr>
+              <a:t>2</a:t>
             </a:r>
             <a:r>
               <a:rPr lang="es-ES_tradnl" sz="900" dirty="0" smtClean="0">
                 <a:effectLst/>
               </a:rPr>
-              <a:t>orbitales     (T^2/R^3 = K = constante)   </a:t>
+              <a:t>/R</a:t>
+            </a:r>
+            <a:r>
+              <a:rPr lang="es-ES_tradnl" sz="900" baseline="30000" dirty="0" smtClean="0">
+                <a:effectLst/>
+              </a:rPr>
+              <a:t>3</a:t>
+            </a:r>
+            <a:r>
+              <a:rPr lang="es-ES_tradnl" sz="900" dirty="0" smtClean="0">
+                <a:effectLst/>
+              </a:rPr>
+              <a:t> </a:t>
+            </a:r>
+            <a:r>
+              <a:rPr lang="es-ES_tradnl" sz="900" dirty="0" smtClean="0">
+                <a:effectLst/>
+              </a:rPr>
+              <a:t>= K = </a:t>
+            </a:r>
+            <a:r>
+              <a:rPr lang="es-ES_tradnl" sz="900" dirty="0" err="1" smtClean="0">
+                <a:effectLst/>
+              </a:rPr>
+              <a:t>cte</a:t>
+            </a:r>
+            <a:r>
+              <a:rPr lang="es-ES_tradnl" sz="900" dirty="0" smtClean="0">
+                <a:effectLst/>
+              </a:rPr>
+              <a:t>)   </a:t>
             </a:r>
             <a:endParaRPr kumimoji="0" lang="es-ES" sz="900" b="0" i="0" u="none" strike="noStrike" kern="0" cap="none" spc="0" normalizeH="0" baseline="0" noProof="0" dirty="0">
               <a:ln>
@@ -2704,12 +2765,6 @@
               </a:rPr>
               <a:t>efinición</a:t>
             </a:r>
-            <a:endParaRPr lang="es-ES_tradnl" sz="1000" kern="0" dirty="0" smtClean="0">
-              <a:solidFill>
-                <a:sysClr val="window" lastClr="FFFFFF"/>
-              </a:solidFill>
-              <a:latin typeface="Calibri"/>
-            </a:endParaRPr>
           </a:p>
         </p:txBody>
       </p:sp>
@@ -2826,7 +2881,7 @@
                   <a:sysClr val="windowText" lastClr="000000"/>
                 </a:solidFill>
               </a:rPr>
-              <a:t>en el plano bajo la acción de un campo </a:t>
+              <a:t>en el </a:t>
             </a:r>
             <a:r>
               <a:rPr lang="es-ES_tradnl" sz="900" kern="0" dirty="0" smtClean="0">
@@ -2834,7 +2889,23 @@
                   <a:sysClr val="windowText" lastClr="000000"/>
                 </a:solidFill>
               </a:rPr>
-              <a:t>gravitacional</a:t>
+              <a:t>plano, </a:t>
+            </a:r>
+            <a:r>
+              <a:rPr lang="es-ES_tradnl" sz="900" kern="0" dirty="0">
+                <a:solidFill>
+                  <a:sysClr val="windowText" lastClr="000000"/>
+                </a:solidFill>
+              </a:rPr>
+              <a:t>bajo la acción de un campo </a:t>
+            </a:r>
+            <a:r>
+              <a:rPr lang="es-ES_tradnl" sz="900" kern="0" dirty="0" smtClean="0">
+                <a:solidFill>
+                  <a:sysClr val="windowText" lastClr="000000"/>
+                </a:solidFill>
+              </a:rPr>
+              <a:t>gravitacional.</a:t>
             </a:r>
             <a:endParaRPr kumimoji="0" lang="es-ES" sz="900" b="0" i="0" u="none" strike="noStrike" kern="0" cap="none" spc="0" normalizeH="0" baseline="0" noProof="0" dirty="0">
               <a:ln>
@@ -3060,24 +3131,7 @@
                 <a:ea typeface="+mn-ea"/>
                 <a:cs typeface="+mn-cs"/>
               </a:rPr>
-              <a:t> </a:t>
-            </a:r>
-            <a:r>
-              <a:rPr kumimoji="0" lang="es-ES" sz="900" b="0" i="0" u="none" strike="noStrike" kern="0" cap="none" spc="0" normalizeH="0" baseline="0" noProof="0" dirty="0" smtClean="0">
-                <a:ln>
-                  <a:noFill/>
-                </a:ln>
-                <a:solidFill>
-                  <a:sysClr val="windowText" lastClr="000000"/>
-                </a:solidFill>
-                <a:effectLst/>
-                <a:uLnTx/>
-                <a:uFillTx/>
-                <a:latin typeface="Calibri"/>
-                <a:ea typeface="+mn-ea"/>
-                <a:cs typeface="+mn-cs"/>
-              </a:rPr>
-              <a:t>(</a:t>
+              <a:t> (</a:t>
             </a:r>
             <a:r>
               <a:rPr lang="es-ES_tradnl" sz="900" kern="0" noProof="0" dirty="0" smtClean="0">
@@ -3139,15 +3193,7 @@
                   <a:sysClr val="windowText" lastClr="000000"/>
                 </a:solidFill>
               </a:rPr>
-              <a:t>je </a:t>
-            </a:r>
-            <a:r>
-              <a:rPr lang="es-ES_tradnl" sz="900" kern="0" dirty="0" smtClean="0">
-                <a:solidFill>
-                  <a:sysClr val="windowText" lastClr="000000"/>
-                </a:solidFill>
-              </a:rPr>
-              <a:t>y (</a:t>
+              <a:t>je y (</a:t>
             </a:r>
             <a:r>
               <a:rPr lang="es-ES_tradnl" sz="900" dirty="0" smtClean="0"/>
@@ -3434,7 +3480,7 @@
               <a:t> </a:t>
             </a:r>
             <a:r>
-              <a:rPr lang="en-US" sz="900" kern="0" dirty="0" err="1" smtClean="0">
+              <a:rPr lang="es-CO" sz="900" kern="0" dirty="0" smtClean="0">
                 <a:solidFill>
                   <a:sysClr val="windowText" lastClr="000000"/>
                 </a:solidFill>
@@ -3447,7 +3493,15 @@
                   <a:sysClr val="windowText" lastClr="000000"/>
                 </a:solidFill>
               </a:rPr>
-              <a:t> en</a:t>
+              <a:t> </a:t>
+            </a:r>
+            <a:r>
+              <a:rPr lang="en-US" sz="900" kern="0" dirty="0" smtClean="0">
+                <a:solidFill>
+                  <a:sysClr val="windowText" lastClr="000000"/>
+                </a:solidFill>
+              </a:rPr>
+              <a:t>en</a:t>
             </a:r>
             <a:endParaRPr kumimoji="0" lang="es-ES" sz="900" b="0" i="0" u="none" strike="noStrike" kern="0" cap="none" spc="0" normalizeH="0" baseline="0" noProof="0" dirty="0">
               <a:ln>
@@ -3800,12 +3854,6 @@
               </a:rPr>
               <a:t>angencial</a:t>
             </a:r>
-            <a:endParaRPr lang="es-ES" sz="900" kern="0" dirty="0" smtClean="0">
-              <a:solidFill>
-                <a:sysClr val="windowText" lastClr="000000"/>
-              </a:solidFill>
-              <a:latin typeface="Calibri"/>
-            </a:endParaRPr>
           </a:p>
           <a:p>
             <a:pPr algn="ctr" defTabSz="914400"/>
@@ -3820,7 +3868,15 @@
             </a:r>
             <a:r>
               <a:rPr lang="el-GR" sz="900" dirty="0"/>
-              <a:t>at = R </a:t>
+              <a:t>a</a:t>
+            </a:r>
+            <a:r>
+              <a:rPr lang="el-GR" sz="900" baseline="-25000" dirty="0"/>
+              <a:t>t</a:t>
+            </a:r>
+            <a:r>
+              <a:rPr lang="el-GR" sz="900" dirty="0"/>
+              <a:t> = R </a:t>
             </a:r>
             <a:r>
               <a:rPr lang="el-GR" sz="900" dirty="0" smtClean="0"/>
@@ -3837,16 +3893,7 @@
               <a:buChar char="•"/>
             </a:pPr>
             <a:r>
-              <a:rPr lang="es-ES_tradnl" sz="900" kern="0" dirty="0">
-                <a:solidFill>
-                  <a:sysClr val="windowText" lastClr="000000"/>
-                </a:solidFill>
-                <a:latin typeface="Calibri"/>
-              </a:rPr>
-              <a:t>c</a:t>
-            </a:r>
-            <a:r>
-              <a:rPr kumimoji="0" lang="es-ES_tradnl" sz="900" b="0" i="0" u="none" strike="noStrike" kern="0" cap="none" spc="0" normalizeH="0" baseline="0" noProof="0" dirty="0" err="1" smtClean="0">
+              <a:rPr kumimoji="0" lang="es-ES_tradnl" sz="900" b="0" i="0" u="none" strike="noStrike" kern="0" cap="none" spc="0" normalizeH="0" baseline="0" noProof="0" dirty="0" smtClean="0">
                 <a:ln>
                   <a:noFill/>
                 </a:ln>
@@ -3860,7 +3907,7 @@
                 <a:ea typeface="+mn-ea"/>
                 <a:cs typeface="+mn-cs"/>
               </a:rPr>
-              <a:t>entrípeta</a:t>
+              <a:t>centrípeta</a:t>
             </a:r>
             <a:endParaRPr kumimoji="0" lang="es-ES_tradnl" sz="900" b="0" i="0" u="none" strike="noStrike" kern="0" cap="none" spc="0" normalizeH="0" baseline="0" noProof="0" dirty="0" smtClean="0">
               <a:ln>
@@ -3881,7 +3928,31 @@
             <a:pPr algn="ctr" defTabSz="914400"/>
             <a:r>
               <a:rPr lang="en-US" sz="900" dirty="0" smtClean="0"/>
-              <a:t>(ac = v^2/R)</a:t>
+              <a:t>(a</a:t>
+            </a:r>
+            <a:r>
+              <a:rPr lang="en-US" sz="900" baseline="-25000" dirty="0" smtClean="0"/>
+              <a:t>c</a:t>
+            </a:r>
+            <a:r>
+              <a:rPr lang="en-US" sz="900" dirty="0" smtClean="0"/>
+              <a:t> = </a:t>
+            </a:r>
+            <a:r>
+              <a:rPr lang="en-US" sz="900" dirty="0" smtClean="0"/>
+              <a:t>v</a:t>
+            </a:r>
+            <a:r>
+              <a:rPr lang="en-US" sz="900" baseline="30000" dirty="0" smtClean="0"/>
+              <a:t>2</a:t>
+            </a:r>
+            <a:r>
+              <a:rPr lang="en-US" sz="900" dirty="0" smtClean="0"/>
+              <a:t>/R</a:t>
+            </a:r>
+            <a:r>
+              <a:rPr lang="en-US" sz="900" dirty="0" smtClean="0"/>
+              <a:t>)</a:t>
             </a:r>
             <a:r>
               <a:rPr lang="en-US" sz="900" dirty="0" smtClean="0">
@@ -4147,15 +4218,7 @@
                   <a:sysClr val="windowText" lastClr="000000"/>
                 </a:solidFill>
               </a:rPr>
-              <a:t>celeración </a:t>
-            </a:r>
-            <a:r>
-              <a:rPr lang="es-ES_tradnl" sz="900" kern="0" dirty="0" smtClean="0">
-                <a:solidFill>
-                  <a:sysClr val="windowText" lastClr="000000"/>
-                </a:solidFill>
-              </a:rPr>
-              <a:t>angular</a:t>
+              <a:t>celeración angular</a:t>
             </a:r>
           </a:p>
           <a:p>
@@ -4433,20 +4496,8 @@
               <a:t>eriodo </a:t>
             </a:r>
             <a:r>
-              <a:rPr lang="it-IT" sz="900" dirty="0"/>
-              <a:t>(</a:t>
-            </a:r>
-            <a:r>
               <a:rPr lang="it-IT" sz="900" dirty="0" smtClean="0"/>
-              <a:t>f </a:t>
-            </a:r>
-            <a:r>
-              <a:rPr lang="it-IT" sz="900" dirty="0"/>
-              <a:t>= n/</a:t>
-            </a:r>
-            <a:r>
-              <a:rPr lang="it-IT" sz="900" dirty="0" smtClean="0"/>
-              <a:t>t)</a:t>
+              <a:t>(T= t/n)</a:t>
             </a:r>
             <a:r>
               <a:rPr lang="it-IT" sz="900" dirty="0" smtClean="0">
@@ -4454,6 +4505,9 @@
               </a:rPr>
               <a:t> </a:t>
             </a:r>
+            <a:endParaRPr lang="it-IT" sz="900" dirty="0" smtClean="0">
+              <a:effectLst/>
+            </a:endParaRPr>
           </a:p>
           <a:p>
             <a:pPr marL="171450" indent="-171450">
@@ -4472,13 +4526,7 @@
               <a:rPr lang="es-ES_tradnl" sz="900" dirty="0" smtClean="0">
                 <a:effectLst/>
               </a:rPr>
-              <a:t> </a:t>
-            </a:r>
-            <a:r>
-              <a:rPr lang="es-ES_tradnl" sz="900" dirty="0" smtClean="0">
-                <a:effectLst/>
-              </a:rPr>
-              <a:t>(</a:t>
+              <a:t> (</a:t>
             </a:r>
             <a:r>
               <a:rPr lang="es-ES_tradnl" sz="900" dirty="0" smtClean="0"/>
@@ -4514,7 +4562,13 @@
               <a:rPr lang="es-ES_tradnl" sz="900" dirty="0" smtClean="0">
                 <a:effectLst/>
               </a:rPr>
-              <a:t>              (</a:t>
+              <a:t>              </a:t>
+            </a:r>
+            <a:r>
+              <a:rPr lang="es-ES_tradnl" sz="900" dirty="0" smtClean="0">
+                <a:effectLst/>
+              </a:rPr>
+              <a:t>(</a:t>
             </a:r>
             <a:r>
               <a:rPr lang="es-ES_tradnl" sz="900" dirty="0" smtClean="0"/>
@@ -4522,54 +4576,23 @@
             </a:r>
             <a:r>
               <a:rPr lang="es-ES_tradnl" sz="900" dirty="0"/>
-              <a:t>= ∆φ/∆</a:t>
-            </a:r>
-            <a:r>
-              <a:rPr lang="es-ES_tradnl" sz="900" dirty="0" smtClean="0"/>
-              <a:t>t</a:t>
-            </a:r>
-            <a:r>
-              <a:rPr lang="es-ES_tradnl" sz="900" dirty="0"/>
+              <a:t>= 2π/T</a:t>
+            </a:r>
+            <a:r>
+              <a:rPr lang="es-ES_tradnl" sz="900" dirty="0" smtClean="0">
+                <a:effectLst/>
+              </a:rPr>
               <a:t> </a:t>
             </a:r>
             <a:r>
-              <a:rPr lang="es-ES_tradnl" sz="900" dirty="0" smtClean="0"/>
-              <a:t>- </a:t>
-            </a:r>
-            <a:r>
               <a:rPr lang="es-ES_tradnl" sz="900" dirty="0" smtClean="0">
                 <a:effectLst/>
               </a:rPr>
-              <a:t> </a:t>
-            </a:r>
-            <a:r>
-              <a:rPr lang="es-ES_tradnl" sz="900" dirty="0" smtClean="0"/>
-              <a:t>ω </a:t>
-            </a:r>
-            <a:r>
-              <a:rPr lang="es-ES_tradnl" sz="900" dirty="0"/>
-              <a:t>= 2π/T</a:t>
-            </a:r>
-            <a:r>
-              <a:rPr lang="es-ES_tradnl" sz="900" dirty="0" smtClean="0">
-                <a:effectLst/>
-              </a:rPr>
-              <a:t> - </a:t>
-            </a:r>
-            <a:r>
-              <a:rPr lang="es-ES_tradnl" sz="900" dirty="0" smtClean="0"/>
-              <a:t>ω </a:t>
-            </a:r>
-            <a:r>
-              <a:rPr lang="es-ES_tradnl" sz="900" dirty="0"/>
-              <a:t>= 2π∙f</a:t>
-            </a:r>
-            <a:r>
-              <a:rPr lang="es-ES_tradnl" sz="900" dirty="0" smtClean="0">
-                <a:effectLst/>
-              </a:rPr>
-              <a:t> )</a:t>
-            </a:r>
+              <a:t>)</a:t>
+            </a:r>
+            <a:endParaRPr lang="es-ES_tradnl" sz="900" dirty="0" smtClean="0">
+              <a:effectLst/>
+            </a:endParaRPr>
           </a:p>
           <a:p>
             <a:pPr marL="171450" indent="-171450">
@@ -4592,7 +4615,13 @@
               <a:rPr lang="es-ES_tradnl" sz="900" dirty="0" smtClean="0">
                 <a:effectLst/>
               </a:rPr>
-              <a:t>                                               (</a:t>
+              <a:t> </a:t>
+            </a:r>
+            <a:r>
+              <a:rPr lang="es-ES_tradnl" sz="900" dirty="0" smtClean="0">
+                <a:effectLst/>
+              </a:rPr>
+              <a:t> ( </a:t>
             </a:r>
             <a:r>
               <a:rPr lang="es-ES_tradnl" sz="900" dirty="0" smtClean="0"/>
@@ -4600,34 +4629,6 @@
             </a:r>
             <a:r>
               <a:rPr lang="es-ES_tradnl" sz="900" dirty="0"/>
-              <a:t>= s/t</a:t>
-            </a:r>
-            <a:r>
-              <a:rPr lang="es-ES_tradnl" sz="900" dirty="0" smtClean="0">
-                <a:effectLst/>
-              </a:rPr>
-              <a:t> - </a:t>
-            </a:r>
-            <a:r>
-              <a:rPr lang="es-ES_tradnl" sz="900" dirty="0" smtClean="0"/>
-              <a:t>v </a:t>
-            </a:r>
-            <a:r>
-              <a:rPr lang="es-ES_tradnl" sz="900" dirty="0"/>
-              <a:t>= 2πR/T</a:t>
-            </a:r>
-            <a:r>
-              <a:rPr lang="es-ES_tradnl" sz="900" dirty="0" smtClean="0">
-                <a:effectLst/>
-              </a:rPr>
-              <a:t> - </a:t>
-            </a:r>
-            <a:r>
-              <a:rPr lang="es-ES_tradnl" sz="900" dirty="0" smtClean="0"/>
-              <a:t>v </a:t>
-            </a:r>
-            <a:r>
-              <a:rPr lang="es-ES_tradnl" sz="900" dirty="0"/>
               <a:t>= </a:t>
             </a:r>
             <a:r>
@@ -4640,6 +4641,15 @@
               </a:rPr>
               <a:t> </a:t>
             </a:r>
+            <a:r>
+              <a:rPr lang="es-ES_tradnl" sz="900" dirty="0" smtClean="0">
+                <a:effectLst/>
+              </a:rPr>
+              <a:t>)</a:t>
+            </a:r>
+            <a:endParaRPr lang="es-ES_tradnl" sz="900" dirty="0" smtClean="0">
+              <a:effectLst/>
+            </a:endParaRPr>
           </a:p>
           <a:p>
             <a:pPr marL="171450" indent="-171450">
@@ -4651,30 +4661,48 @@
               <a:t>c</a:t>
             </a:r>
             <a:r>
-              <a:rPr lang="es-ES_tradnl" sz="900" smtClean="0">
-                <a:effectLst/>
-              </a:rPr>
-              <a:t>ambio </a:t>
-            </a:r>
-            <a:r>
               <a:rPr lang="es-ES_tradnl" sz="900" dirty="0" smtClean="0">
                 <a:effectLst/>
               </a:rPr>
-              <a:t>de dirección de la velocidad lineal que genera aceleración centrípeta (</a:t>
-            </a:r>
-            <a:r>
-              <a:rPr lang="en-US" sz="900" dirty="0"/>
-              <a:t>ac = v^2/R</a:t>
-            </a:r>
-            <a:r>
-              <a:rPr lang="en-US" sz="900" dirty="0" smtClean="0">
-                <a:effectLst/>
-              </a:rPr>
-              <a:t>  - </a:t>
+              <a:t>ambio de dirección de la velocidad lineal que genera aceleración centrípeta </a:t>
+            </a:r>
+            <a:r>
+              <a:rPr lang="es-ES_tradnl" sz="900" dirty="0" smtClean="0">
+                <a:effectLst/>
+              </a:rPr>
+              <a:t>(</a:t>
+            </a:r>
+            <a:r>
+              <a:rPr lang="en-US" sz="900" dirty="0" smtClean="0"/>
+              <a:t>a</a:t>
+            </a:r>
+            <a:r>
+              <a:rPr lang="en-US" sz="900" baseline="-25000" dirty="0" smtClean="0"/>
+              <a:t>c</a:t>
+            </a:r>
+            <a:r>
+              <a:rPr lang="el-GR" sz="900" dirty="0" smtClean="0"/>
+              <a:t> </a:t>
             </a:r>
             <a:r>
               <a:rPr lang="el-GR" sz="900" dirty="0"/>
-              <a:t>ac = ω^2 R</a:t>
+              <a:t>= </a:t>
+            </a:r>
+            <a:r>
+              <a:rPr lang="el-GR" sz="900" dirty="0" smtClean="0"/>
+              <a:t>ω</a:t>
+            </a:r>
+            <a:r>
+              <a:rPr lang="en-US" sz="900" baseline="30000" dirty="0" smtClean="0"/>
+              <a:t>2</a:t>
+            </a:r>
+            <a:r>
+              <a:rPr lang="el-GR" sz="900" dirty="0" smtClean="0"/>
+              <a:t> </a:t>
+            </a:r>
+            <a:r>
+              <a:rPr lang="el-GR" sz="900" dirty="0"/>
+              <a:t>R</a:t>
             </a:r>
             <a:r>
               <a:rPr lang="el-GR" sz="900" dirty="0" smtClean="0">

</xml_diff>